<commit_message>
Update presentation even more
</commit_message>
<xml_diff>
--- a/Presentation/C-ITS.pptx
+++ b/Presentation/C-ITS.pptx
@@ -7857,17 +7857,6 @@
           <a:lstStyle/>
           <a:p>
             <a:r>
-              <a:rPr lang="en-US" sz="2000" dirty="0" err="1">
-                <a:solidFill>
-                  <a:schemeClr val="tx1">
-                    <a:lumMod val="95000"/>
-                    <a:lumOff val="5000"/>
-                  </a:schemeClr>
-                </a:solidFill>
-              </a:rPr>
-              <a:t>OnBoard</a:t>
-            </a:r>
-            <a:r>
               <a:rPr lang="en-US" sz="2000" dirty="0">
                 <a:solidFill>
                   <a:schemeClr val="tx1">
@@ -7876,7 +7865,7 @@
                   </a:schemeClr>
                 </a:solidFill>
               </a:rPr>
-              <a:t> Unit providing C-ITS capabilities</a:t>
+              <a:t>Onboard Unit providing C-ITS capabilities</a:t>
             </a:r>
           </a:p>
           <a:p>
@@ -14160,6 +14149,21 @@
               <a:t>Questions?</a:t>
             </a:r>
           </a:p>
+          <a:p>
+            <a:r>
+              <a:rPr lang="en-US" dirty="0"/>
+              <a:t>Project files are also available on GitHub: </a:t>
+            </a:r>
+          </a:p>
+          <a:p>
+            <a:pPr marL="457200" lvl="1" indent="0">
+              <a:buNone/>
+            </a:pPr>
+            <a:r>
+              <a:rPr lang="en-US" dirty="0"/>
+              <a:t>https://github.com/LF-RoGu/Model-Base-Systems</a:t>
+            </a:r>
+          </a:p>
         </p:txBody>
       </p:sp>
     </p:spTree>
@@ -14287,7 +14291,7 @@
           <a:p>
             <a:r>
               <a:rPr lang="en-US" dirty="0"/>
-              <a:t>Fig. 5-6, </a:t>
+              <a:t>Fig. 5-7, </a:t>
             </a:r>
             <a:r>
               <a:rPr lang="en-US" dirty="0">
@@ -14300,12 +14304,6 @@
           <a:p>
             <a:r>
               <a:rPr lang="en-US" dirty="0"/>
-              <a:t>Fig. 7,</a:t>
-            </a:r>
-          </a:p>
-          <a:p>
-            <a:r>
-              <a:rPr lang="en-US" dirty="0"/>
               <a:t>Fig. 8, </a:t>
             </a:r>
             <a:r>
@@ -14372,34 +14370,6 @@
           </a:p>
           <a:p>
             <a:endParaRPr lang="en-US" dirty="0"/>
-          </a:p>
-        </p:txBody>
-      </p:sp>
-      <p:sp>
-        <p:nvSpPr>
-          <p:cNvPr id="4" name="Footer Placeholder 3">
-            <a:extLst>
-              <a:ext uri="{FF2B5EF4-FFF2-40B4-BE49-F238E27FC236}">
-                <a16:creationId xmlns:a16="http://schemas.microsoft.com/office/drawing/2014/main" id="{93B93AA8-5126-5AD0-416A-C59D79F70EB8}"/>
-              </a:ext>
-            </a:extLst>
-          </p:cNvPr>
-          <p:cNvSpPr>
-            <a:spLocks noGrp="1"/>
-          </p:cNvSpPr>
-          <p:nvPr>
-            <p:ph type="ftr" sz="quarter" idx="11"/>
-          </p:nvPr>
-        </p:nvSpPr>
-        <p:spPr/>
-        <p:txBody>
-          <a:bodyPr/>
-          <a:lstStyle/>
-          <a:p>
-            <a:r>
-              <a:rPr lang="en-US"/>
-              <a:t>Fig. 1, Awarenees Driving</a:t>
-            </a:r>
           </a:p>
         </p:txBody>
       </p:sp>

</xml_diff>

<commit_message>
Updated OBU logic and pptx
</commit_message>
<xml_diff>
--- a/Presentation/C-ITS.pptx
+++ b/Presentation/C-ITS.pptx
@@ -149,7 +149,7 @@
   <pc:docChgLst>
     <pc:chgData name="Luis Fernando Rodriguez Gutierrez" userId="47d13518-703e-4604-b449-ba54b8feb907" providerId="ADAL" clId="{56418ACE-61C6-4AD3-AD16-975169FAD560}"/>
     <pc:docChg chg="undo custSel addSld delSld modSld">
-      <pc:chgData name="Luis Fernando Rodriguez Gutierrez" userId="47d13518-703e-4604-b449-ba54b8feb907" providerId="ADAL" clId="{56418ACE-61C6-4AD3-AD16-975169FAD560}" dt="2025-01-25T13:35:42.062" v="1886"/>
+      <pc:chgData name="Luis Fernando Rodriguez Gutierrez" userId="47d13518-703e-4604-b449-ba54b8feb907" providerId="ADAL" clId="{56418ACE-61C6-4AD3-AD16-975169FAD560}" dt="2025-02-02T19:18:27.197" v="1898" actId="1076"/>
       <pc:docMkLst>
         <pc:docMk/>
       </pc:docMkLst>
@@ -183,22 +183,6 @@
             <ac:spMk id="6" creationId="{92FBDE1F-7A4A-E896-58F8-31909E874318}"/>
           </ac:spMkLst>
         </pc:spChg>
-        <pc:spChg chg="add del">
-          <ac:chgData name="Luis Fernando Rodriguez Gutierrez" userId="47d13518-703e-4604-b449-ba54b8feb907" providerId="ADAL" clId="{56418ACE-61C6-4AD3-AD16-975169FAD560}" dt="2025-01-25T11:12:06.410" v="7" actId="26606"/>
-          <ac:spMkLst>
-            <pc:docMk/>
-            <pc:sldMk cId="2580789304" sldId="256"/>
-            <ac:spMk id="10" creationId="{ECC07320-C2CA-4E29-8481-9D9E143C7788}"/>
-          </ac:spMkLst>
-        </pc:spChg>
-        <pc:spChg chg="add del">
-          <ac:chgData name="Luis Fernando Rodriguez Gutierrez" userId="47d13518-703e-4604-b449-ba54b8feb907" providerId="ADAL" clId="{56418ACE-61C6-4AD3-AD16-975169FAD560}" dt="2025-01-25T11:12:06.410" v="7" actId="26606"/>
-          <ac:spMkLst>
-            <pc:docMk/>
-            <pc:sldMk cId="2580789304" sldId="256"/>
-            <ac:spMk id="12" creationId="{178FB36B-5BFE-42CA-BC60-1115E0D95EEC}"/>
-          </ac:spMkLst>
-        </pc:spChg>
         <pc:spChg chg="add">
           <ac:chgData name="Luis Fernando Rodriguez Gutierrez" userId="47d13518-703e-4604-b449-ba54b8feb907" providerId="ADAL" clId="{56418ACE-61C6-4AD3-AD16-975169FAD560}" dt="2025-01-25T11:12:06.410" v="7" actId="26606"/>
           <ac:spMkLst>
@@ -230,14 +214,6 @@
           <pc:docMk/>
           <pc:sldMk cId="2801368605" sldId="257"/>
         </pc:sldMkLst>
-        <pc:spChg chg="del">
-          <ac:chgData name="Luis Fernando Rodriguez Gutierrez" userId="47d13518-703e-4604-b449-ba54b8feb907" providerId="ADAL" clId="{56418ACE-61C6-4AD3-AD16-975169FAD560}" dt="2025-01-25T11:14:38.917" v="33" actId="478"/>
-          <ac:spMkLst>
-            <pc:docMk/>
-            <pc:sldMk cId="2801368605" sldId="257"/>
-            <ac:spMk id="2" creationId="{768A049C-21B3-A0B4-0D37-91A39F59DA1D}"/>
-          </ac:spMkLst>
-        </pc:spChg>
         <pc:spChg chg="mod ord">
           <ac:chgData name="Luis Fernando Rodriguez Gutierrez" userId="47d13518-703e-4604-b449-ba54b8feb907" providerId="ADAL" clId="{56418ACE-61C6-4AD3-AD16-975169FAD560}" dt="2025-01-25T11:24:36.034" v="277" actId="20577"/>
           <ac:spMkLst>
@@ -252,22 +228,6 @@
             <pc:docMk/>
             <pc:sldMk cId="2801368605" sldId="257"/>
             <ac:spMk id="4" creationId="{31BE6B59-1158-5BD3-4345-F4AFCCCB38CF}"/>
-          </ac:spMkLst>
-        </pc:spChg>
-        <pc:spChg chg="del mod ord">
-          <ac:chgData name="Luis Fernando Rodriguez Gutierrez" userId="47d13518-703e-4604-b449-ba54b8feb907" providerId="ADAL" clId="{56418ACE-61C6-4AD3-AD16-975169FAD560}" dt="2025-01-25T11:16:02.550" v="138" actId="478"/>
-          <ac:spMkLst>
-            <pc:docMk/>
-            <pc:sldMk cId="2801368605" sldId="257"/>
-            <ac:spMk id="5" creationId="{21DD6191-5CB7-2106-3CFE-CFD30A36CCCA}"/>
-          </ac:spMkLst>
-        </pc:spChg>
-        <pc:spChg chg="add del mod">
-          <ac:chgData name="Luis Fernando Rodriguez Gutierrez" userId="47d13518-703e-4604-b449-ba54b8feb907" providerId="ADAL" clId="{56418ACE-61C6-4AD3-AD16-975169FAD560}" dt="2025-01-25T11:14:41.291" v="34" actId="478"/>
-          <ac:spMkLst>
-            <pc:docMk/>
-            <pc:sldMk cId="2801368605" sldId="257"/>
-            <ac:spMk id="7" creationId="{7F63D419-549A-C04E-7E62-45D3BBE2C5CB}"/>
           </ac:spMkLst>
         </pc:spChg>
         <pc:spChg chg="add mod">
@@ -326,14 +286,6 @@
             <ac:picMk id="1026" creationId="{B0A9F003-218C-159C-095C-3EA066EFFFA3}"/>
           </ac:picMkLst>
         </pc:picChg>
-        <pc:picChg chg="add del mod">
-          <ac:chgData name="Luis Fernando Rodriguez Gutierrez" userId="47d13518-703e-4604-b449-ba54b8feb907" providerId="ADAL" clId="{56418ACE-61C6-4AD3-AD16-975169FAD560}" dt="2025-01-25T11:25:40.350" v="283" actId="478"/>
-          <ac:picMkLst>
-            <pc:docMk/>
-            <pc:sldMk cId="2801368605" sldId="257"/>
-            <ac:picMk id="1028" creationId="{EF1A44D1-32DB-1875-F99F-0F98D12A8C95}"/>
-          </ac:picMkLst>
-        </pc:picChg>
         <pc:cxnChg chg="add">
           <ac:chgData name="Luis Fernando Rodriguez Gutierrez" userId="47d13518-703e-4604-b449-ba54b8feb907" providerId="ADAL" clId="{56418ACE-61C6-4AD3-AD16-975169FAD560}" dt="2025-01-25T11:16:00.180" v="137" actId="26606"/>
           <ac:cxnSpMkLst>
@@ -365,84 +317,12 @@
             <ac:spMk id="3" creationId="{57AACDBA-2A32-E01D-0AE2-0A192EF1CA59}"/>
           </ac:spMkLst>
         </pc:spChg>
-        <pc:spChg chg="del mod">
-          <ac:chgData name="Luis Fernando Rodriguez Gutierrez" userId="47d13518-703e-4604-b449-ba54b8feb907" providerId="ADAL" clId="{56418ACE-61C6-4AD3-AD16-975169FAD560}" dt="2025-01-25T11:30:53.196" v="481" actId="478"/>
-          <ac:spMkLst>
-            <pc:docMk/>
-            <pc:sldMk cId="324375167" sldId="258"/>
-            <ac:spMk id="4" creationId="{3063DC31-878B-2431-E58A-853697C7801F}"/>
-          </ac:spMkLst>
-        </pc:spChg>
         <pc:spChg chg="add mod">
           <ac:chgData name="Luis Fernando Rodriguez Gutierrez" userId="47d13518-703e-4604-b449-ba54b8feb907" providerId="ADAL" clId="{56418ACE-61C6-4AD3-AD16-975169FAD560}" dt="2025-01-25T11:43:20.486" v="798" actId="20577"/>
           <ac:spMkLst>
             <pc:docMk/>
             <pc:sldMk cId="324375167" sldId="258"/>
             <ac:spMk id="9" creationId="{087C42A1-9341-69D4-524F-997F0BDBD514}"/>
-          </ac:spMkLst>
-        </pc:spChg>
-        <pc:spChg chg="add del">
-          <ac:chgData name="Luis Fernando Rodriguez Gutierrez" userId="47d13518-703e-4604-b449-ba54b8feb907" providerId="ADAL" clId="{56418ACE-61C6-4AD3-AD16-975169FAD560}" dt="2025-01-25T11:30:14.094" v="439" actId="26606"/>
-          <ac:spMkLst>
-            <pc:docMk/>
-            <pc:sldMk cId="324375167" sldId="258"/>
-            <ac:spMk id="13" creationId="{53E60C6D-4E85-4E14-BCDF-BF15C241F7CA}"/>
-          </ac:spMkLst>
-        </pc:spChg>
-        <pc:spChg chg="add del">
-          <ac:chgData name="Luis Fernando Rodriguez Gutierrez" userId="47d13518-703e-4604-b449-ba54b8feb907" providerId="ADAL" clId="{56418ACE-61C6-4AD3-AD16-975169FAD560}" dt="2025-01-25T11:30:14.094" v="439" actId="26606"/>
-          <ac:spMkLst>
-            <pc:docMk/>
-            <pc:sldMk cId="324375167" sldId="258"/>
-            <ac:spMk id="15" creationId="{7D42D292-4C48-479B-9E59-E29CD9871C0C}"/>
-          </ac:spMkLst>
-        </pc:spChg>
-        <pc:spChg chg="add del">
-          <ac:chgData name="Luis Fernando Rodriguez Gutierrez" userId="47d13518-703e-4604-b449-ba54b8feb907" providerId="ADAL" clId="{56418ACE-61C6-4AD3-AD16-975169FAD560}" dt="2025-01-25T11:30:14.094" v="439" actId="26606"/>
-          <ac:spMkLst>
-            <pc:docMk/>
-            <pc:sldMk cId="324375167" sldId="258"/>
-            <ac:spMk id="17" creationId="{533DF362-939D-4EEE-8DC4-6B54607E5611}"/>
-          </ac:spMkLst>
-        </pc:spChg>
-        <pc:spChg chg="add del">
-          <ac:chgData name="Luis Fernando Rodriguez Gutierrez" userId="47d13518-703e-4604-b449-ba54b8feb907" providerId="ADAL" clId="{56418ACE-61C6-4AD3-AD16-975169FAD560}" dt="2025-01-25T11:30:48.921" v="480" actId="26606"/>
-          <ac:spMkLst>
-            <pc:docMk/>
-            <pc:sldMk cId="324375167" sldId="258"/>
-            <ac:spMk id="19" creationId="{129F4FEF-3F4E-4042-8E6D-C24E201FB31A}"/>
-          </ac:spMkLst>
-        </pc:spChg>
-        <pc:spChg chg="add del">
-          <ac:chgData name="Luis Fernando Rodriguez Gutierrez" userId="47d13518-703e-4604-b449-ba54b8feb907" providerId="ADAL" clId="{56418ACE-61C6-4AD3-AD16-975169FAD560}" dt="2025-01-25T11:30:56.256" v="482" actId="26606"/>
-          <ac:spMkLst>
-            <pc:docMk/>
-            <pc:sldMk cId="324375167" sldId="258"/>
-            <ac:spMk id="24" creationId="{A2679492-7988-4050-9056-542444452411}"/>
-          </ac:spMkLst>
-        </pc:spChg>
-        <pc:spChg chg="add del">
-          <ac:chgData name="Luis Fernando Rodriguez Gutierrez" userId="47d13518-703e-4604-b449-ba54b8feb907" providerId="ADAL" clId="{56418ACE-61C6-4AD3-AD16-975169FAD560}" dt="2025-01-25T11:30:56.256" v="482" actId="26606"/>
-          <ac:spMkLst>
-            <pc:docMk/>
-            <pc:sldMk cId="324375167" sldId="258"/>
-            <ac:spMk id="26" creationId="{B091B163-7D61-4891-ABCF-5C13D9C418D0}"/>
-          </ac:spMkLst>
-        </pc:spChg>
-        <pc:spChg chg="add del">
-          <ac:chgData name="Luis Fernando Rodriguez Gutierrez" userId="47d13518-703e-4604-b449-ba54b8feb907" providerId="ADAL" clId="{56418ACE-61C6-4AD3-AD16-975169FAD560}" dt="2025-01-25T11:35:02.103" v="735" actId="26606"/>
-          <ac:spMkLst>
-            <pc:docMk/>
-            <pc:sldMk cId="324375167" sldId="258"/>
-            <ac:spMk id="33" creationId="{A2679492-7988-4050-9056-542444452411}"/>
-          </ac:spMkLst>
-        </pc:spChg>
-        <pc:spChg chg="add del">
-          <ac:chgData name="Luis Fernando Rodriguez Gutierrez" userId="47d13518-703e-4604-b449-ba54b8feb907" providerId="ADAL" clId="{56418ACE-61C6-4AD3-AD16-975169FAD560}" dt="2025-01-25T11:35:02.103" v="735" actId="26606"/>
-          <ac:spMkLst>
-            <pc:docMk/>
-            <pc:sldMk cId="324375167" sldId="258"/>
-            <ac:spMk id="35" creationId="{B091B163-7D61-4891-ABCF-5C13D9C418D0}"/>
           </ac:spMkLst>
         </pc:spChg>
         <pc:spChg chg="add del">
@@ -453,46 +333,6 @@
             <ac:spMk id="39" creationId="{129F4FEF-3F4E-4042-8E6D-C24E201FB31A}"/>
           </ac:spMkLst>
         </pc:spChg>
-        <pc:spChg chg="add del">
-          <ac:chgData name="Luis Fernando Rodriguez Gutierrez" userId="47d13518-703e-4604-b449-ba54b8feb907" providerId="ADAL" clId="{56418ACE-61C6-4AD3-AD16-975169FAD560}" dt="2025-01-25T11:35:41.652" v="748" actId="26606"/>
-          <ac:spMkLst>
-            <pc:docMk/>
-            <pc:sldMk cId="324375167" sldId="258"/>
-            <ac:spMk id="41" creationId="{9D9CE3C4-25D7-403C-9312-F3B39099D298}"/>
-          </ac:spMkLst>
-        </pc:spChg>
-        <pc:spChg chg="add del">
-          <ac:chgData name="Luis Fernando Rodriguez Gutierrez" userId="47d13518-703e-4604-b449-ba54b8feb907" providerId="ADAL" clId="{56418ACE-61C6-4AD3-AD16-975169FAD560}" dt="2025-01-25T11:34:48.281" v="733" actId="26606"/>
-          <ac:spMkLst>
-            <pc:docMk/>
-            <pc:sldMk cId="324375167" sldId="258"/>
-            <ac:spMk id="42" creationId="{AD96FDFD-4E42-4A06-B8B5-768A1DB9C2A9}"/>
-          </ac:spMkLst>
-        </pc:spChg>
-        <pc:spChg chg="add del">
-          <ac:chgData name="Luis Fernando Rodriguez Gutierrez" userId="47d13518-703e-4604-b449-ba54b8feb907" providerId="ADAL" clId="{56418ACE-61C6-4AD3-AD16-975169FAD560}" dt="2025-01-25T11:35:36.247" v="746" actId="26606"/>
-          <ac:spMkLst>
-            <pc:docMk/>
-            <pc:sldMk cId="324375167" sldId="258"/>
-            <ac:spMk id="44" creationId="{AD96FDFD-4E42-4A06-B8B5-768A1DB9C2A9}"/>
-          </ac:spMkLst>
-        </pc:spChg>
-        <pc:grpChg chg="add del">
-          <ac:chgData name="Luis Fernando Rodriguez Gutierrez" userId="47d13518-703e-4604-b449-ba54b8feb907" providerId="ADAL" clId="{56418ACE-61C6-4AD3-AD16-975169FAD560}" dt="2025-01-25T11:35:41.652" v="748" actId="26606"/>
-          <ac:grpSpMkLst>
-            <pc:docMk/>
-            <pc:sldMk cId="324375167" sldId="258"/>
-            <ac:grpSpMk id="46" creationId="{2E56C079-9BED-4728-8FAD-2F9E3A179149}"/>
-          </ac:grpSpMkLst>
-        </pc:grpChg>
-        <pc:grpChg chg="add del">
-          <ac:chgData name="Luis Fernando Rodriguez Gutierrez" userId="47d13518-703e-4604-b449-ba54b8feb907" providerId="ADAL" clId="{56418ACE-61C6-4AD3-AD16-975169FAD560}" dt="2025-01-25T11:35:41.652" v="748" actId="26606"/>
-          <ac:grpSpMkLst>
-            <pc:docMk/>
-            <pc:sldMk cId="324375167" sldId="258"/>
-            <ac:grpSpMk id="57" creationId="{51AC3D20-E4ED-49E6-AADF-E32D5427ECD0}"/>
-          </ac:grpSpMkLst>
-        </pc:grpChg>
         <pc:picChg chg="add mod ord">
           <ac:chgData name="Luis Fernando Rodriguez Gutierrez" userId="47d13518-703e-4604-b449-ba54b8feb907" providerId="ADAL" clId="{56418ACE-61C6-4AD3-AD16-975169FAD560}" dt="2025-01-25T11:35:41.652" v="748" actId="26606"/>
           <ac:picMkLst>
@@ -509,38 +349,6 @@
             <ac:picMk id="8" creationId="{73DB612C-3BD1-A984-24C3-F287B3E6E7A1}"/>
           </ac:picMkLst>
         </pc:picChg>
-        <pc:picChg chg="add del mod ord">
-          <ac:chgData name="Luis Fernando Rodriguez Gutierrez" userId="47d13518-703e-4604-b449-ba54b8feb907" providerId="ADAL" clId="{56418ACE-61C6-4AD3-AD16-975169FAD560}" dt="2025-01-25T11:34:50.492" v="734" actId="478"/>
-          <ac:picMkLst>
-            <pc:docMk/>
-            <pc:sldMk cId="324375167" sldId="258"/>
-            <ac:picMk id="11" creationId="{AF68611B-8143-8A75-946A-710F1F68F1BF}"/>
-          </ac:picMkLst>
-        </pc:picChg>
-        <pc:picChg chg="add del mod ord">
-          <ac:chgData name="Luis Fernando Rodriguez Gutierrez" userId="47d13518-703e-4604-b449-ba54b8feb907" providerId="ADAL" clId="{56418ACE-61C6-4AD3-AD16-975169FAD560}" dt="2025-01-25T11:43:16.050" v="796" actId="21"/>
-          <ac:picMkLst>
-            <pc:docMk/>
-            <pc:sldMk cId="324375167" sldId="258"/>
-            <ac:picMk id="14" creationId="{5F400523-7B4B-5265-84EA-EEC455909426}"/>
-          </ac:picMkLst>
-        </pc:picChg>
-        <pc:cxnChg chg="add del">
-          <ac:chgData name="Luis Fernando Rodriguez Gutierrez" userId="47d13518-703e-4604-b449-ba54b8feb907" providerId="ADAL" clId="{56418ACE-61C6-4AD3-AD16-975169FAD560}" dt="2025-01-25T11:30:56.256" v="482" actId="26606"/>
-          <ac:cxnSpMkLst>
-            <pc:docMk/>
-            <pc:sldMk cId="324375167" sldId="258"/>
-            <ac:cxnSpMk id="28" creationId="{C49DA8F6-BCC1-4447-B54C-57856834B94B}"/>
-          </ac:cxnSpMkLst>
-        </pc:cxnChg>
-        <pc:cxnChg chg="add del">
-          <ac:chgData name="Luis Fernando Rodriguez Gutierrez" userId="47d13518-703e-4604-b449-ba54b8feb907" providerId="ADAL" clId="{56418ACE-61C6-4AD3-AD16-975169FAD560}" dt="2025-01-25T11:35:02.103" v="735" actId="26606"/>
-          <ac:cxnSpMkLst>
-            <pc:docMk/>
-            <pc:sldMk cId="324375167" sldId="258"/>
-            <ac:cxnSpMk id="37" creationId="{C49DA8F6-BCC1-4447-B54C-57856834B94B}"/>
-          </ac:cxnSpMkLst>
-        </pc:cxnChg>
       </pc:sldChg>
       <pc:sldChg chg="addSp delSp modSp mod">
         <pc:chgData name="Luis Fernando Rodriguez Gutierrez" userId="47d13518-703e-4604-b449-ba54b8feb907" providerId="ADAL" clId="{56418ACE-61C6-4AD3-AD16-975169FAD560}" dt="2025-01-25T11:43:51.721" v="807" actId="1076"/>
@@ -548,22 +356,6 @@
           <pc:docMk/>
           <pc:sldMk cId="1490319551" sldId="259"/>
         </pc:sldMkLst>
-        <pc:spChg chg="del mod">
-          <ac:chgData name="Luis Fernando Rodriguez Gutierrez" userId="47d13518-703e-4604-b449-ba54b8feb907" providerId="ADAL" clId="{56418ACE-61C6-4AD3-AD16-975169FAD560}" dt="2025-01-25T11:43:33.430" v="803" actId="478"/>
-          <ac:spMkLst>
-            <pc:docMk/>
-            <pc:sldMk cId="1490319551" sldId="259"/>
-            <ac:spMk id="3" creationId="{94B5A8C0-A0C1-0419-9975-A203A734121C}"/>
-          </ac:spMkLst>
-        </pc:spChg>
-        <pc:spChg chg="del">
-          <ac:chgData name="Luis Fernando Rodriguez Gutierrez" userId="47d13518-703e-4604-b449-ba54b8feb907" providerId="ADAL" clId="{56418ACE-61C6-4AD3-AD16-975169FAD560}" dt="2025-01-25T11:42:40.879" v="793" actId="478"/>
-          <ac:spMkLst>
-            <pc:docMk/>
-            <pc:sldMk cId="1490319551" sldId="259"/>
-            <ac:spMk id="4" creationId="{D0DEF27A-31AC-3F9F-9A68-9DA526E61497}"/>
-          </ac:spMkLst>
-        </pc:spChg>
         <pc:spChg chg="add mod">
           <ac:chgData name="Luis Fernando Rodriguez Gutierrez" userId="47d13518-703e-4604-b449-ba54b8feb907" providerId="ADAL" clId="{56418ACE-61C6-4AD3-AD16-975169FAD560}" dt="2025-01-25T11:43:51.721" v="807" actId="1076"/>
           <ac:spMkLst>
@@ -611,14 +403,6 @@
           <pc:docMk/>
           <pc:sldMk cId="2327144799" sldId="260"/>
         </pc:sldMkLst>
-        <pc:spChg chg="mod">
-          <ac:chgData name="Luis Fernando Rodriguez Gutierrez" userId="47d13518-703e-4604-b449-ba54b8feb907" providerId="ADAL" clId="{56418ACE-61C6-4AD3-AD16-975169FAD560}" dt="2025-01-25T11:13:52.444" v="29" actId="20577"/>
-          <ac:spMkLst>
-            <pc:docMk/>
-            <pc:sldMk cId="2327144799" sldId="260"/>
-            <ac:spMk id="3" creationId="{A31721F8-6950-845B-363D-5A8AC4DDE947}"/>
-          </ac:spMkLst>
-        </pc:spChg>
       </pc:sldChg>
       <pc:sldChg chg="addSp delSp modSp mod setBg">
         <pc:chgData name="Luis Fernando Rodriguez Gutierrez" userId="47d13518-703e-4604-b449-ba54b8feb907" providerId="ADAL" clId="{56418ACE-61C6-4AD3-AD16-975169FAD560}" dt="2025-01-25T13:34:26.463" v="1859" actId="20577"/>
@@ -640,14 +424,6 @@
             <pc:docMk/>
             <pc:sldMk cId="570102859" sldId="261"/>
             <ac:spMk id="3" creationId="{ADC23DE7-688F-96A3-C6A2-5683C853A5E8}"/>
-          </ac:spMkLst>
-        </pc:spChg>
-        <pc:spChg chg="del mod">
-          <ac:chgData name="Luis Fernando Rodriguez Gutierrez" userId="47d13518-703e-4604-b449-ba54b8feb907" providerId="ADAL" clId="{56418ACE-61C6-4AD3-AD16-975169FAD560}" dt="2025-01-25T13:27:16.929" v="1636" actId="478"/>
-          <ac:spMkLst>
-            <pc:docMk/>
-            <pc:sldMk cId="570102859" sldId="261"/>
-            <ac:spMk id="4" creationId="{BA4BF87F-5F60-3A65-F0C8-17B7BCDDAD1F}"/>
           </ac:spMkLst>
         </pc:spChg>
         <pc:spChg chg="add">
@@ -712,14 +488,6 @@
           <pc:docMk/>
           <pc:sldMk cId="386249461" sldId="266"/>
         </pc:sldMkLst>
-        <pc:spChg chg="mod">
-          <ac:chgData name="Luis Fernando Rodriguez Gutierrez" userId="47d13518-703e-4604-b449-ba54b8feb907" providerId="ADAL" clId="{56418ACE-61C6-4AD3-AD16-975169FAD560}" dt="2025-01-25T11:26:01.990" v="289"/>
-          <ac:spMkLst>
-            <pc:docMk/>
-            <pc:sldMk cId="386249461" sldId="266"/>
-            <ac:spMk id="2" creationId="{20DE77A8-A463-6C3C-5F33-CA26C9BFA88C}"/>
-          </ac:spMkLst>
-        </pc:spChg>
       </pc:sldChg>
       <pc:sldChg chg="addSp delSp modSp add mod setBg delDesignElem">
         <pc:chgData name="Luis Fernando Rodriguez Gutierrez" userId="47d13518-703e-4604-b449-ba54b8feb907" providerId="ADAL" clId="{56418ACE-61C6-4AD3-AD16-975169FAD560}" dt="2025-01-25T11:28:24.458" v="423" actId="20577"/>
@@ -751,62 +519,6 @@
             <ac:spMk id="8" creationId="{0552A7F3-458D-4FEA-DDD5-539E5E2B7B1D}"/>
           </ac:spMkLst>
         </pc:spChg>
-        <pc:spChg chg="del">
-          <ac:chgData name="Luis Fernando Rodriguez Gutierrez" userId="47d13518-703e-4604-b449-ba54b8feb907" providerId="ADAL" clId="{56418ACE-61C6-4AD3-AD16-975169FAD560}" dt="2025-01-25T11:26:05.611" v="291"/>
-          <ac:spMkLst>
-            <pc:docMk/>
-            <pc:sldMk cId="458714686" sldId="267"/>
-            <ac:spMk id="1031" creationId="{A43F7702-3460-46EA-46D7-E416590467AB}"/>
-          </ac:spMkLst>
-        </pc:spChg>
-        <pc:spChg chg="del">
-          <ac:chgData name="Luis Fernando Rodriguez Gutierrez" userId="47d13518-703e-4604-b449-ba54b8feb907" providerId="ADAL" clId="{56418ACE-61C6-4AD3-AD16-975169FAD560}" dt="2025-01-25T11:26:05.611" v="291"/>
-          <ac:spMkLst>
-            <pc:docMk/>
-            <pc:sldMk cId="458714686" sldId="267"/>
-            <ac:spMk id="1033" creationId="{2DCABAF4-3186-DB09-73AD-853977DE4116}"/>
-          </ac:spMkLst>
-        </pc:spChg>
-        <pc:spChg chg="del">
-          <ac:chgData name="Luis Fernando Rodriguez Gutierrez" userId="47d13518-703e-4604-b449-ba54b8feb907" providerId="ADAL" clId="{56418ACE-61C6-4AD3-AD16-975169FAD560}" dt="2025-01-25T11:26:05.611" v="291"/>
-          <ac:spMkLst>
-            <pc:docMk/>
-            <pc:sldMk cId="458714686" sldId="267"/>
-            <ac:spMk id="1035" creationId="{3AD4B917-6C7F-39DF-F9A4-02F56792F5DF}"/>
-          </ac:spMkLst>
-        </pc:spChg>
-        <pc:spChg chg="del">
-          <ac:chgData name="Luis Fernando Rodriguez Gutierrez" userId="47d13518-703e-4604-b449-ba54b8feb907" providerId="ADAL" clId="{56418ACE-61C6-4AD3-AD16-975169FAD560}" dt="2025-01-25T11:26:05.611" v="291"/>
-          <ac:spMkLst>
-            <pc:docMk/>
-            <pc:sldMk cId="458714686" sldId="267"/>
-            <ac:spMk id="1037" creationId="{C24DCCF7-84F1-F0C1-0879-E1385CF93318}"/>
-          </ac:spMkLst>
-        </pc:spChg>
-        <pc:spChg chg="del">
-          <ac:chgData name="Luis Fernando Rodriguez Gutierrez" userId="47d13518-703e-4604-b449-ba54b8feb907" providerId="ADAL" clId="{56418ACE-61C6-4AD3-AD16-975169FAD560}" dt="2025-01-25T11:26:05.611" v="291"/>
-          <ac:spMkLst>
-            <pc:docMk/>
-            <pc:sldMk cId="458714686" sldId="267"/>
-            <ac:spMk id="1039" creationId="{14E94B1A-8519-2A55-FF58-1D6F16258EDE}"/>
-          </ac:spMkLst>
-        </pc:spChg>
-        <pc:spChg chg="add del">
-          <ac:chgData name="Luis Fernando Rodriguez Gutierrez" userId="47d13518-703e-4604-b449-ba54b8feb907" providerId="ADAL" clId="{56418ACE-61C6-4AD3-AD16-975169FAD560}" dt="2025-01-25T11:26:28.514" v="299" actId="26606"/>
-          <ac:spMkLst>
-            <pc:docMk/>
-            <pc:sldMk cId="458714686" sldId="267"/>
-            <ac:spMk id="2055" creationId="{04812C46-200A-4DEB-A05E-3ED6C68C2387}"/>
-          </ac:spMkLst>
-        </pc:spChg>
-        <pc:spChg chg="add del">
-          <ac:chgData name="Luis Fernando Rodriguez Gutierrez" userId="47d13518-703e-4604-b449-ba54b8feb907" providerId="ADAL" clId="{56418ACE-61C6-4AD3-AD16-975169FAD560}" dt="2025-01-25T11:26:28.514" v="299" actId="26606"/>
-          <ac:spMkLst>
-            <pc:docMk/>
-            <pc:sldMk cId="458714686" sldId="267"/>
-            <ac:spMk id="2057" creationId="{D1EA859B-E555-4109-94F3-6700E046E008}"/>
-          </ac:spMkLst>
-        </pc:spChg>
         <pc:spChg chg="add">
           <ac:chgData name="Luis Fernando Rodriguez Gutierrez" userId="47d13518-703e-4604-b449-ba54b8feb907" providerId="ADAL" clId="{56418ACE-61C6-4AD3-AD16-975169FAD560}" dt="2025-01-25T11:26:28.521" v="300" actId="26606"/>
           <ac:spMkLst>
@@ -831,14 +543,6 @@
             <ac:spMk id="2061" creationId="{59383CF9-23B5-4335-9B21-1791C4CF1C75}"/>
           </ac:spMkLst>
         </pc:spChg>
-        <pc:picChg chg="del">
-          <ac:chgData name="Luis Fernando Rodriguez Gutierrez" userId="47d13518-703e-4604-b449-ba54b8feb907" providerId="ADAL" clId="{56418ACE-61C6-4AD3-AD16-975169FAD560}" dt="2025-01-25T11:26:08.196" v="293" actId="478"/>
-          <ac:picMkLst>
-            <pc:docMk/>
-            <pc:sldMk cId="458714686" sldId="267"/>
-            <ac:picMk id="1026" creationId="{86982A20-DFBC-B323-9E1D-A0175E63709C}"/>
-          </ac:picMkLst>
-        </pc:picChg>
         <pc:picChg chg="add mod ord">
           <ac:chgData name="Luis Fernando Rodriguez Gutierrez" userId="47d13518-703e-4604-b449-ba54b8feb907" providerId="ADAL" clId="{56418ACE-61C6-4AD3-AD16-975169FAD560}" dt="2025-01-25T11:26:28.521" v="300" actId="26606"/>
           <ac:picMkLst>
@@ -847,14 +551,6 @@
             <ac:picMk id="2050" creationId="{7047240B-DEB0-40A3-7B42-BA5664D5D480}"/>
           </ac:picMkLst>
         </pc:picChg>
-        <pc:cxnChg chg="del">
-          <ac:chgData name="Luis Fernando Rodriguez Gutierrez" userId="47d13518-703e-4604-b449-ba54b8feb907" providerId="ADAL" clId="{56418ACE-61C6-4AD3-AD16-975169FAD560}" dt="2025-01-25T11:26:05.611" v="291"/>
-          <ac:cxnSpMkLst>
-            <pc:docMk/>
-            <pc:sldMk cId="458714686" sldId="267"/>
-            <ac:cxnSpMk id="1041" creationId="{6338D5C5-7DC3-C872-C975-6729BA786131}"/>
-          </ac:cxnSpMkLst>
-        </pc:cxnChg>
       </pc:sldChg>
       <pc:sldChg chg="addSp delSp modSp new mod setBg">
         <pc:chgData name="Luis Fernando Rodriguez Gutierrez" userId="47d13518-703e-4604-b449-ba54b8feb907" providerId="ADAL" clId="{56418ACE-61C6-4AD3-AD16-975169FAD560}" dt="2025-01-25T12:00:32.087" v="838" actId="1076"/>
@@ -870,52 +566,12 @@
             <ac:spMk id="2" creationId="{B9A22025-07E4-5931-1B34-C78BA1604FCA}"/>
           </ac:spMkLst>
         </pc:spChg>
-        <pc:spChg chg="del mod">
-          <ac:chgData name="Luis Fernando Rodriguez Gutierrez" userId="47d13518-703e-4604-b449-ba54b8feb907" providerId="ADAL" clId="{56418ACE-61C6-4AD3-AD16-975169FAD560}" dt="2025-01-25T11:58:57.482" v="808" actId="478"/>
-          <ac:spMkLst>
-            <pc:docMk/>
-            <pc:sldMk cId="1016966140" sldId="268"/>
-            <ac:spMk id="3" creationId="{80156D45-3707-71FB-7FCC-3CEE4E8F2F63}"/>
-          </ac:spMkLst>
-        </pc:spChg>
-        <pc:spChg chg="del mod ord">
-          <ac:chgData name="Luis Fernando Rodriguez Gutierrez" userId="47d13518-703e-4604-b449-ba54b8feb907" providerId="ADAL" clId="{56418ACE-61C6-4AD3-AD16-975169FAD560}" dt="2025-01-25T11:42:38.001" v="792" actId="478"/>
-          <ac:spMkLst>
-            <pc:docMk/>
-            <pc:sldMk cId="1016966140" sldId="268"/>
-            <ac:spMk id="4" creationId="{FBACC38A-9032-4889-7887-6CD74551E158}"/>
-          </ac:spMkLst>
-        </pc:spChg>
-        <pc:spChg chg="add del">
-          <ac:chgData name="Luis Fernando Rodriguez Gutierrez" userId="47d13518-703e-4604-b449-ba54b8feb907" providerId="ADAL" clId="{56418ACE-61C6-4AD3-AD16-975169FAD560}" dt="2025-01-25T11:42:06.158" v="785" actId="26606"/>
-          <ac:spMkLst>
-            <pc:docMk/>
-            <pc:sldMk cId="1016966140" sldId="268"/>
-            <ac:spMk id="15" creationId="{F35DB090-93B5-4581-8D71-BB3839684BFF}"/>
-          </ac:spMkLst>
-        </pc:spChg>
         <pc:spChg chg="add">
           <ac:chgData name="Luis Fernando Rodriguez Gutierrez" userId="47d13518-703e-4604-b449-ba54b8feb907" providerId="ADAL" clId="{56418ACE-61C6-4AD3-AD16-975169FAD560}" dt="2025-01-25T12:00:24.033" v="835" actId="26606"/>
           <ac:spMkLst>
             <pc:docMk/>
             <pc:sldMk cId="1016966140" sldId="268"/>
             <ac:spMk id="16" creationId="{398F3DEE-0E56-499F-AFAE-C2DA7C2C815B}"/>
-          </ac:spMkLst>
-        </pc:spChg>
-        <pc:spChg chg="add del">
-          <ac:chgData name="Luis Fernando Rodriguez Gutierrez" userId="47d13518-703e-4604-b449-ba54b8feb907" providerId="ADAL" clId="{56418ACE-61C6-4AD3-AD16-975169FAD560}" dt="2025-01-25T11:42:06.158" v="785" actId="26606"/>
-          <ac:spMkLst>
-            <pc:docMk/>
-            <pc:sldMk cId="1016966140" sldId="268"/>
-            <ac:spMk id="17" creationId="{A0DE92DF-4769-4DE9-93FD-EE31271850CA}"/>
-          </ac:spMkLst>
-        </pc:spChg>
-        <pc:spChg chg="add del">
-          <ac:chgData name="Luis Fernando Rodriguez Gutierrez" userId="47d13518-703e-4604-b449-ba54b8feb907" providerId="ADAL" clId="{56418ACE-61C6-4AD3-AD16-975169FAD560}" dt="2025-01-25T12:00:20.066" v="834" actId="26606"/>
-          <ac:spMkLst>
-            <pc:docMk/>
-            <pc:sldMk cId="1016966140" sldId="268"/>
-            <ac:spMk id="19" creationId="{398F3DEE-0E56-499F-AFAE-C2DA7C2C815B}"/>
           </ac:spMkLst>
         </pc:spChg>
         <pc:spChg chg="add">
@@ -926,28 +582,12 @@
             <ac:spMk id="20" creationId="{33B9C452-2C6E-4D52-8FC7-669291EE91D4}"/>
           </ac:spMkLst>
         </pc:spChg>
-        <pc:spChg chg="add del">
-          <ac:chgData name="Luis Fernando Rodriguez Gutierrez" userId="47d13518-703e-4604-b449-ba54b8feb907" providerId="ADAL" clId="{56418ACE-61C6-4AD3-AD16-975169FAD560}" dt="2025-01-25T12:00:20.066" v="834" actId="26606"/>
-          <ac:spMkLst>
-            <pc:docMk/>
-            <pc:sldMk cId="1016966140" sldId="268"/>
-            <ac:spMk id="21" creationId="{33B9C452-2C6E-4D52-8FC7-669291EE91D4}"/>
-          </ac:spMkLst>
-        </pc:spChg>
         <pc:spChg chg="add">
           <ac:chgData name="Luis Fernando Rodriguez Gutierrez" userId="47d13518-703e-4604-b449-ba54b8feb907" providerId="ADAL" clId="{56418ACE-61C6-4AD3-AD16-975169FAD560}" dt="2025-01-25T12:00:24.033" v="835" actId="26606"/>
           <ac:spMkLst>
             <pc:docMk/>
             <pc:sldMk cId="1016966140" sldId="268"/>
             <ac:spMk id="22" creationId="{34E1CC44-1B7F-472B-B668-B4F2F4723D7E}"/>
-          </ac:spMkLst>
-        </pc:spChg>
-        <pc:spChg chg="add del">
-          <ac:chgData name="Luis Fernando Rodriguez Gutierrez" userId="47d13518-703e-4604-b449-ba54b8feb907" providerId="ADAL" clId="{56418ACE-61C6-4AD3-AD16-975169FAD560}" dt="2025-01-25T12:00:20.066" v="834" actId="26606"/>
-          <ac:spMkLst>
-            <pc:docMk/>
-            <pc:sldMk cId="1016966140" sldId="268"/>
-            <ac:spMk id="23" creationId="{34E1CC44-1B7F-472B-B668-B4F2F4723D7E}"/>
           </ac:spMkLst>
         </pc:spChg>
         <pc:spChg chg="add">
@@ -958,14 +598,6 @@
             <ac:spMk id="24" creationId="{B5BAD077-4A41-458D-9909-1A108699EA38}"/>
           </ac:spMkLst>
         </pc:spChg>
-        <pc:spChg chg="add del">
-          <ac:chgData name="Luis Fernando Rodriguez Gutierrez" userId="47d13518-703e-4604-b449-ba54b8feb907" providerId="ADAL" clId="{56418ACE-61C6-4AD3-AD16-975169FAD560}" dt="2025-01-25T12:00:20.066" v="834" actId="26606"/>
-          <ac:spMkLst>
-            <pc:docMk/>
-            <pc:sldMk cId="1016966140" sldId="268"/>
-            <ac:spMk id="25" creationId="{B5BAD077-4A41-458D-9909-1A108699EA38}"/>
-          </ac:spMkLst>
-        </pc:spChg>
         <pc:spChg chg="add">
           <ac:chgData name="Luis Fernando Rodriguez Gutierrez" userId="47d13518-703e-4604-b449-ba54b8feb907" providerId="ADAL" clId="{56418ACE-61C6-4AD3-AD16-975169FAD560}" dt="2025-01-25T12:00:24.033" v="835" actId="26606"/>
           <ac:spMkLst>
@@ -974,62 +606,6 @@
             <ac:spMk id="26" creationId="{F1FC21CE-01FD-49CC-BAFC-06F38B34BB81}"/>
           </ac:spMkLst>
         </pc:spChg>
-        <pc:spChg chg="add del">
-          <ac:chgData name="Luis Fernando Rodriguez Gutierrez" userId="47d13518-703e-4604-b449-ba54b8feb907" providerId="ADAL" clId="{56418ACE-61C6-4AD3-AD16-975169FAD560}" dt="2025-01-25T12:00:20.066" v="834" actId="26606"/>
-          <ac:spMkLst>
-            <pc:docMk/>
-            <pc:sldMk cId="1016966140" sldId="268"/>
-            <ac:spMk id="27" creationId="{F1FC21CE-01FD-49CC-BAFC-06F38B34BB81}"/>
-          </ac:spMkLst>
-        </pc:spChg>
-        <pc:picChg chg="add del mod">
-          <ac:chgData name="Luis Fernando Rodriguez Gutierrez" userId="47d13518-703e-4604-b449-ba54b8feb907" providerId="ADAL" clId="{56418ACE-61C6-4AD3-AD16-975169FAD560}" dt="2025-01-25T11:40:41.078" v="764" actId="478"/>
-          <ac:picMkLst>
-            <pc:docMk/>
-            <pc:sldMk cId="1016966140" sldId="268"/>
-            <ac:picMk id="6" creationId="{521FAAE0-F9AC-C667-B214-A58E7DD7989B}"/>
-          </ac:picMkLst>
-        </pc:picChg>
-        <pc:picChg chg="add del mod ord">
-          <ac:chgData name="Luis Fernando Rodriguez Gutierrez" userId="47d13518-703e-4604-b449-ba54b8feb907" providerId="ADAL" clId="{56418ACE-61C6-4AD3-AD16-975169FAD560}" dt="2025-01-25T12:00:29.071" v="836" actId="478"/>
-          <ac:picMkLst>
-            <pc:docMk/>
-            <pc:sldMk cId="1016966140" sldId="268"/>
-            <ac:picMk id="8" creationId="{2B24F1BA-0219-6725-29F0-25E26FBC2A6E}"/>
-          </ac:picMkLst>
-        </pc:picChg>
-        <pc:picChg chg="add del mod ord">
-          <ac:chgData name="Luis Fernando Rodriguez Gutierrez" userId="47d13518-703e-4604-b449-ba54b8feb907" providerId="ADAL" clId="{56418ACE-61C6-4AD3-AD16-975169FAD560}" dt="2025-01-25T12:00:29.071" v="836" actId="478"/>
-          <ac:picMkLst>
-            <pc:docMk/>
-            <pc:sldMk cId="1016966140" sldId="268"/>
-            <ac:picMk id="10" creationId="{45EEC6D6-51F2-887D-6021-10BFDE2E26A7}"/>
-          </ac:picMkLst>
-        </pc:picChg>
-        <pc:picChg chg="add del mod ord">
-          <ac:chgData name="Luis Fernando Rodriguez Gutierrez" userId="47d13518-703e-4604-b449-ba54b8feb907" providerId="ADAL" clId="{56418ACE-61C6-4AD3-AD16-975169FAD560}" dt="2025-01-25T12:00:29.071" v="836" actId="478"/>
-          <ac:picMkLst>
-            <pc:docMk/>
-            <pc:sldMk cId="1016966140" sldId="268"/>
-            <ac:picMk id="12" creationId="{5D25535C-5E40-CE45-A92C-3DCA119F0525}"/>
-          </ac:picMkLst>
-        </pc:picChg>
-        <pc:picChg chg="add del mod">
-          <ac:chgData name="Luis Fernando Rodriguez Gutierrez" userId="47d13518-703e-4604-b449-ba54b8feb907" providerId="ADAL" clId="{56418ACE-61C6-4AD3-AD16-975169FAD560}" dt="2025-01-25T12:00:29.071" v="836" actId="478"/>
-          <ac:picMkLst>
-            <pc:docMk/>
-            <pc:sldMk cId="1016966140" sldId="268"/>
-            <ac:picMk id="14" creationId="{FA834FC4-5053-F290-90FF-8F3B1B02101E}"/>
-          </ac:picMkLst>
-        </pc:picChg>
-        <pc:picChg chg="add del">
-          <ac:chgData name="Luis Fernando Rodriguez Gutierrez" userId="47d13518-703e-4604-b449-ba54b8feb907" providerId="ADAL" clId="{56418ACE-61C6-4AD3-AD16-975169FAD560}" dt="2025-01-25T11:59:19.853" v="814" actId="22"/>
-          <ac:picMkLst>
-            <pc:docMk/>
-            <pc:sldMk cId="1016966140" sldId="268"/>
-            <ac:picMk id="18" creationId="{191876A3-D583-9BDA-40A9-2FC660243B42}"/>
-          </ac:picMkLst>
-        </pc:picChg>
         <pc:picChg chg="add mod">
           <ac:chgData name="Luis Fernando Rodriguez Gutierrez" userId="47d13518-703e-4604-b449-ba54b8feb907" providerId="ADAL" clId="{56418ACE-61C6-4AD3-AD16-975169FAD560}" dt="2025-01-25T12:00:32.087" v="838" actId="1076"/>
           <ac:picMkLst>
@@ -1082,46 +658,6 @@
             <pc:docMk/>
             <pc:sldMk cId="1202540096" sldId="269"/>
             <ac:spMk id="2" creationId="{454F84B2-C464-8BAB-584C-21DBC24195E2}"/>
-          </ac:spMkLst>
-        </pc:spChg>
-        <pc:spChg chg="add del">
-          <ac:chgData name="Luis Fernando Rodriguez Gutierrez" userId="47d13518-703e-4604-b449-ba54b8feb907" providerId="ADAL" clId="{56418ACE-61C6-4AD3-AD16-975169FAD560}" dt="2025-01-25T12:01:23.937" v="869" actId="26606"/>
-          <ac:spMkLst>
-            <pc:docMk/>
-            <pc:sldMk cId="1202540096" sldId="269"/>
-            <ac:spMk id="11" creationId="{2151139A-886F-4B97-8815-729AD3831BBD}"/>
-          </ac:spMkLst>
-        </pc:spChg>
-        <pc:spChg chg="add del">
-          <ac:chgData name="Luis Fernando Rodriguez Gutierrez" userId="47d13518-703e-4604-b449-ba54b8feb907" providerId="ADAL" clId="{56418ACE-61C6-4AD3-AD16-975169FAD560}" dt="2025-01-25T12:01:23.937" v="869" actId="26606"/>
-          <ac:spMkLst>
-            <pc:docMk/>
-            <pc:sldMk cId="1202540096" sldId="269"/>
-            <ac:spMk id="13" creationId="{AB5E08C4-8CDD-4623-A5B8-E998C6DEE3B7}"/>
-          </ac:spMkLst>
-        </pc:spChg>
-        <pc:spChg chg="add del">
-          <ac:chgData name="Luis Fernando Rodriguez Gutierrez" userId="47d13518-703e-4604-b449-ba54b8feb907" providerId="ADAL" clId="{56418ACE-61C6-4AD3-AD16-975169FAD560}" dt="2025-01-25T12:01:23.937" v="869" actId="26606"/>
-          <ac:spMkLst>
-            <pc:docMk/>
-            <pc:sldMk cId="1202540096" sldId="269"/>
-            <ac:spMk id="15" creationId="{15F33878-D502-4FFA-8ACE-F2AECDB2A23F}"/>
-          </ac:spMkLst>
-        </pc:spChg>
-        <pc:spChg chg="add del">
-          <ac:chgData name="Luis Fernando Rodriguez Gutierrez" userId="47d13518-703e-4604-b449-ba54b8feb907" providerId="ADAL" clId="{56418ACE-61C6-4AD3-AD16-975169FAD560}" dt="2025-01-25T12:01:23.937" v="869" actId="26606"/>
-          <ac:spMkLst>
-            <pc:docMk/>
-            <pc:sldMk cId="1202540096" sldId="269"/>
-            <ac:spMk id="17" creationId="{D3539FEE-81D3-4406-802E-60B20B16F4F6}"/>
-          </ac:spMkLst>
-        </pc:spChg>
-        <pc:spChg chg="add del">
-          <ac:chgData name="Luis Fernando Rodriguez Gutierrez" userId="47d13518-703e-4604-b449-ba54b8feb907" providerId="ADAL" clId="{56418ACE-61C6-4AD3-AD16-975169FAD560}" dt="2025-01-25T12:01:23.937" v="869" actId="26606"/>
-          <ac:spMkLst>
-            <pc:docMk/>
-            <pc:sldMk cId="1202540096" sldId="269"/>
-            <ac:spMk id="19" creationId="{DC701763-729E-462F-A5A8-E0DEFEB1E2E4}"/>
           </ac:spMkLst>
         </pc:spChg>
         <pc:spChg chg="add">
@@ -1180,38 +716,6 @@
             <ac:picMk id="6" creationId="{1D2AB662-E551-9D91-F65F-20617992E6B8}"/>
           </ac:picMkLst>
         </pc:picChg>
-        <pc:picChg chg="del">
-          <ac:chgData name="Luis Fernando Rodriguez Gutierrez" userId="47d13518-703e-4604-b449-ba54b8feb907" providerId="ADAL" clId="{56418ACE-61C6-4AD3-AD16-975169FAD560}" dt="2025-01-25T11:59:31.355" v="823" actId="478"/>
-          <ac:picMkLst>
-            <pc:docMk/>
-            <pc:sldMk cId="1202540096" sldId="269"/>
-            <ac:picMk id="8" creationId="{A00D8A00-EE80-570B-583C-5EBF58942E6E}"/>
-          </ac:picMkLst>
-        </pc:picChg>
-        <pc:picChg chg="del">
-          <ac:chgData name="Luis Fernando Rodriguez Gutierrez" userId="47d13518-703e-4604-b449-ba54b8feb907" providerId="ADAL" clId="{56418ACE-61C6-4AD3-AD16-975169FAD560}" dt="2025-01-25T11:59:31.355" v="823" actId="478"/>
-          <ac:picMkLst>
-            <pc:docMk/>
-            <pc:sldMk cId="1202540096" sldId="269"/>
-            <ac:picMk id="10" creationId="{25195CBB-C5FD-D40A-A457-3B94FF9BE125}"/>
-          </ac:picMkLst>
-        </pc:picChg>
-        <pc:picChg chg="del">
-          <ac:chgData name="Luis Fernando Rodriguez Gutierrez" userId="47d13518-703e-4604-b449-ba54b8feb907" providerId="ADAL" clId="{56418ACE-61C6-4AD3-AD16-975169FAD560}" dt="2025-01-25T11:59:31.355" v="823" actId="478"/>
-          <ac:picMkLst>
-            <pc:docMk/>
-            <pc:sldMk cId="1202540096" sldId="269"/>
-            <ac:picMk id="12" creationId="{117D7850-E888-F2E7-00F6-1BBD411027E1}"/>
-          </ac:picMkLst>
-        </pc:picChg>
-        <pc:picChg chg="del">
-          <ac:chgData name="Luis Fernando Rodriguez Gutierrez" userId="47d13518-703e-4604-b449-ba54b8feb907" providerId="ADAL" clId="{56418ACE-61C6-4AD3-AD16-975169FAD560}" dt="2025-01-25T11:59:31.355" v="823" actId="478"/>
-          <ac:picMkLst>
-            <pc:docMk/>
-            <pc:sldMk cId="1202540096" sldId="269"/>
-            <ac:picMk id="14" creationId="{702C0916-81A0-D072-E839-05D14E310E0F}"/>
-          </ac:picMkLst>
-        </pc:picChg>
       </pc:sldChg>
       <pc:sldChg chg="addSp delSp modSp add mod setBg delDesignElem">
         <pc:chgData name="Luis Fernando Rodriguez Gutierrez" userId="47d13518-703e-4604-b449-ba54b8feb907" providerId="ADAL" clId="{56418ACE-61C6-4AD3-AD16-975169FAD560}" dt="2025-01-25T12:02:47.965" v="882" actId="1076"/>
@@ -1225,86 +729,6 @@
             <pc:docMk/>
             <pc:sldMk cId="1569925214" sldId="270"/>
             <ac:spMk id="2" creationId="{B2319F48-CD7F-E15D-5CCD-AE65C3B714F2}"/>
-          </ac:spMkLst>
-        </pc:spChg>
-        <pc:spChg chg="add del">
-          <ac:chgData name="Luis Fernando Rodriguez Gutierrez" userId="47d13518-703e-4604-b449-ba54b8feb907" providerId="ADAL" clId="{56418ACE-61C6-4AD3-AD16-975169FAD560}" dt="2025-01-25T12:01:20.354" v="868" actId="26606"/>
-          <ac:spMkLst>
-            <pc:docMk/>
-            <pc:sldMk cId="1569925214" sldId="270"/>
-            <ac:spMk id="8" creationId="{2151139A-886F-4B97-8815-729AD3831BBD}"/>
-          </ac:spMkLst>
-        </pc:spChg>
-        <pc:spChg chg="add del">
-          <ac:chgData name="Luis Fernando Rodriguez Gutierrez" userId="47d13518-703e-4604-b449-ba54b8feb907" providerId="ADAL" clId="{56418ACE-61C6-4AD3-AD16-975169FAD560}" dt="2025-01-25T12:01:20.354" v="868" actId="26606"/>
-          <ac:spMkLst>
-            <pc:docMk/>
-            <pc:sldMk cId="1569925214" sldId="270"/>
-            <ac:spMk id="9" creationId="{AB5E08C4-8CDD-4623-A5B8-E998C6DEE3B7}"/>
-          </ac:spMkLst>
-        </pc:spChg>
-        <pc:spChg chg="add del">
-          <ac:chgData name="Luis Fernando Rodriguez Gutierrez" userId="47d13518-703e-4604-b449-ba54b8feb907" providerId="ADAL" clId="{56418ACE-61C6-4AD3-AD16-975169FAD560}" dt="2025-01-25T12:01:20.354" v="868" actId="26606"/>
-          <ac:spMkLst>
-            <pc:docMk/>
-            <pc:sldMk cId="1569925214" sldId="270"/>
-            <ac:spMk id="10" creationId="{15F33878-D502-4FFA-8ACE-F2AECDB2A23F}"/>
-          </ac:spMkLst>
-        </pc:spChg>
-        <pc:spChg chg="del">
-          <ac:chgData name="Luis Fernando Rodriguez Gutierrez" userId="47d13518-703e-4604-b449-ba54b8feb907" providerId="ADAL" clId="{56418ACE-61C6-4AD3-AD16-975169FAD560}" dt="2025-01-25T12:00:39.945" v="843"/>
-          <ac:spMkLst>
-            <pc:docMk/>
-            <pc:sldMk cId="1569925214" sldId="270"/>
-            <ac:spMk id="11" creationId="{E1DA976A-5A8B-AD84-028F-766DD53F1955}"/>
-          </ac:spMkLst>
-        </pc:spChg>
-        <pc:spChg chg="add del">
-          <ac:chgData name="Luis Fernando Rodriguez Gutierrez" userId="47d13518-703e-4604-b449-ba54b8feb907" providerId="ADAL" clId="{56418ACE-61C6-4AD3-AD16-975169FAD560}" dt="2025-01-25T12:01:20.354" v="868" actId="26606"/>
-          <ac:spMkLst>
-            <pc:docMk/>
-            <pc:sldMk cId="1569925214" sldId="270"/>
-            <ac:spMk id="12" creationId="{D3539FEE-81D3-4406-802E-60B20B16F4F6}"/>
-          </ac:spMkLst>
-        </pc:spChg>
-        <pc:spChg chg="del">
-          <ac:chgData name="Luis Fernando Rodriguez Gutierrez" userId="47d13518-703e-4604-b449-ba54b8feb907" providerId="ADAL" clId="{56418ACE-61C6-4AD3-AD16-975169FAD560}" dt="2025-01-25T12:00:39.945" v="843"/>
-          <ac:spMkLst>
-            <pc:docMk/>
-            <pc:sldMk cId="1569925214" sldId="270"/>
-            <ac:spMk id="13" creationId="{5B0927DB-F867-E9CA-4741-F6445A69F213}"/>
-          </ac:spMkLst>
-        </pc:spChg>
-        <pc:spChg chg="add del">
-          <ac:chgData name="Luis Fernando Rodriguez Gutierrez" userId="47d13518-703e-4604-b449-ba54b8feb907" providerId="ADAL" clId="{56418ACE-61C6-4AD3-AD16-975169FAD560}" dt="2025-01-25T12:01:20.354" v="868" actId="26606"/>
-          <ac:spMkLst>
-            <pc:docMk/>
-            <pc:sldMk cId="1569925214" sldId="270"/>
-            <ac:spMk id="14" creationId="{DC701763-729E-462F-A5A8-E0DEFEB1E2E4}"/>
-          </ac:spMkLst>
-        </pc:spChg>
-        <pc:spChg chg="del">
-          <ac:chgData name="Luis Fernando Rodriguez Gutierrez" userId="47d13518-703e-4604-b449-ba54b8feb907" providerId="ADAL" clId="{56418ACE-61C6-4AD3-AD16-975169FAD560}" dt="2025-01-25T12:00:39.945" v="843"/>
-          <ac:spMkLst>
-            <pc:docMk/>
-            <pc:sldMk cId="1569925214" sldId="270"/>
-            <ac:spMk id="15" creationId="{7F3BB344-C713-EC86-3E34-6EB4C904BBB9}"/>
-          </ac:spMkLst>
-        </pc:spChg>
-        <pc:spChg chg="del">
-          <ac:chgData name="Luis Fernando Rodriguez Gutierrez" userId="47d13518-703e-4604-b449-ba54b8feb907" providerId="ADAL" clId="{56418ACE-61C6-4AD3-AD16-975169FAD560}" dt="2025-01-25T12:00:39.945" v="843"/>
-          <ac:spMkLst>
-            <pc:docMk/>
-            <pc:sldMk cId="1569925214" sldId="270"/>
-            <ac:spMk id="17" creationId="{4FD207A6-715E-C61D-47B7-16056DD01EA8}"/>
-          </ac:spMkLst>
-        </pc:spChg>
-        <pc:spChg chg="del">
-          <ac:chgData name="Luis Fernando Rodriguez Gutierrez" userId="47d13518-703e-4604-b449-ba54b8feb907" providerId="ADAL" clId="{56418ACE-61C6-4AD3-AD16-975169FAD560}" dt="2025-01-25T12:00:39.945" v="843"/>
-          <ac:spMkLst>
-            <pc:docMk/>
-            <pc:sldMk cId="1569925214" sldId="270"/>
-            <ac:spMk id="19" creationId="{A5C9FF2D-FDAC-5891-E1C4-68C0CD7A73DD}"/>
           </ac:spMkLst>
         </pc:spChg>
         <pc:spChg chg="add">
@@ -1347,28 +771,12 @@
             <ac:spMk id="29" creationId="{DC701763-729E-462F-A5A8-E0DEFEB1E2E4}"/>
           </ac:spMkLst>
         </pc:spChg>
-        <pc:picChg chg="del">
-          <ac:chgData name="Luis Fernando Rodriguez Gutierrez" userId="47d13518-703e-4604-b449-ba54b8feb907" providerId="ADAL" clId="{56418ACE-61C6-4AD3-AD16-975169FAD560}" dt="2025-01-25T12:00:54.369" v="863" actId="478"/>
-          <ac:picMkLst>
-            <pc:docMk/>
-            <pc:sldMk cId="1569925214" sldId="270"/>
-            <ac:picMk id="4" creationId="{F1C5BFA2-BD68-7817-79C3-6B06CDDB550C}"/>
-          </ac:picMkLst>
-        </pc:picChg>
         <pc:picChg chg="add mod">
           <ac:chgData name="Luis Fernando Rodriguez Gutierrez" userId="47d13518-703e-4604-b449-ba54b8feb907" providerId="ADAL" clId="{56418ACE-61C6-4AD3-AD16-975169FAD560}" dt="2025-01-25T12:02:42.893" v="879" actId="1076"/>
           <ac:picMkLst>
             <pc:docMk/>
             <pc:sldMk cId="1569925214" sldId="270"/>
             <ac:picMk id="5" creationId="{DDF25917-5FCF-3F00-A67D-E31B1F54F358}"/>
-          </ac:picMkLst>
-        </pc:picChg>
-        <pc:picChg chg="del mod">
-          <ac:chgData name="Luis Fernando Rodriguez Gutierrez" userId="47d13518-703e-4604-b449-ba54b8feb907" providerId="ADAL" clId="{56418ACE-61C6-4AD3-AD16-975169FAD560}" dt="2025-01-25T12:00:54.369" v="863" actId="478"/>
-          <ac:picMkLst>
-            <pc:docMk/>
-            <pc:sldMk cId="1569925214" sldId="270"/>
-            <ac:picMk id="6" creationId="{6AB721A6-CEE8-6EF5-81D9-1037CBE2341E}"/>
           </ac:picMkLst>
         </pc:picChg>
         <pc:picChg chg="add mod">
@@ -1402,46 +810,6 @@
           <pc:docMk/>
           <pc:sldMk cId="2321941515" sldId="270"/>
         </pc:sldMkLst>
-        <pc:spChg chg="del">
-          <ac:chgData name="Luis Fernando Rodriguez Gutierrez" userId="47d13518-703e-4604-b449-ba54b8feb907" providerId="ADAL" clId="{56418ACE-61C6-4AD3-AD16-975169FAD560}" dt="2025-01-25T12:00:34.888" v="840"/>
-          <ac:spMkLst>
-            <pc:docMk/>
-            <pc:sldMk cId="2321941515" sldId="270"/>
-            <ac:spMk id="11" creationId="{D4A4587D-8D5F-C2BE-0D8F-D8D1F133689B}"/>
-          </ac:spMkLst>
-        </pc:spChg>
-        <pc:spChg chg="del">
-          <ac:chgData name="Luis Fernando Rodriguez Gutierrez" userId="47d13518-703e-4604-b449-ba54b8feb907" providerId="ADAL" clId="{56418ACE-61C6-4AD3-AD16-975169FAD560}" dt="2025-01-25T12:00:34.888" v="840"/>
-          <ac:spMkLst>
-            <pc:docMk/>
-            <pc:sldMk cId="2321941515" sldId="270"/>
-            <ac:spMk id="13" creationId="{FF2CECA7-A6A4-BF6E-C3CC-E02CE37C6271}"/>
-          </ac:spMkLst>
-        </pc:spChg>
-        <pc:spChg chg="del">
-          <ac:chgData name="Luis Fernando Rodriguez Gutierrez" userId="47d13518-703e-4604-b449-ba54b8feb907" providerId="ADAL" clId="{56418ACE-61C6-4AD3-AD16-975169FAD560}" dt="2025-01-25T12:00:34.888" v="840"/>
-          <ac:spMkLst>
-            <pc:docMk/>
-            <pc:sldMk cId="2321941515" sldId="270"/>
-            <ac:spMk id="15" creationId="{E90A4DA7-90E5-11C6-57F1-BB4A704526AA}"/>
-          </ac:spMkLst>
-        </pc:spChg>
-        <pc:spChg chg="del">
-          <ac:chgData name="Luis Fernando Rodriguez Gutierrez" userId="47d13518-703e-4604-b449-ba54b8feb907" providerId="ADAL" clId="{56418ACE-61C6-4AD3-AD16-975169FAD560}" dt="2025-01-25T12:00:34.888" v="840"/>
-          <ac:spMkLst>
-            <pc:docMk/>
-            <pc:sldMk cId="2321941515" sldId="270"/>
-            <ac:spMk id="17" creationId="{D56B1024-7F30-B700-D450-441916BEDE38}"/>
-          </ac:spMkLst>
-        </pc:spChg>
-        <pc:spChg chg="del">
-          <ac:chgData name="Luis Fernando Rodriguez Gutierrez" userId="47d13518-703e-4604-b449-ba54b8feb907" providerId="ADAL" clId="{56418ACE-61C6-4AD3-AD16-975169FAD560}" dt="2025-01-25T12:00:34.888" v="840"/>
-          <ac:spMkLst>
-            <pc:docMk/>
-            <pc:sldMk cId="2321941515" sldId="270"/>
-            <ac:spMk id="19" creationId="{66323F8F-2C97-55D7-0E86-7B52A6B8DE78}"/>
-          </ac:spMkLst>
-        </pc:spChg>
       </pc:sldChg>
       <pc:sldChg chg="addSp delSp modSp add mod setBg">
         <pc:chgData name="Luis Fernando Rodriguez Gutierrez" userId="47d13518-703e-4604-b449-ba54b8feb907" providerId="ADAL" clId="{56418ACE-61C6-4AD3-AD16-975169FAD560}" dt="2025-01-25T13:34:44.554" v="1874" actId="27636"/>
@@ -1481,30 +849,6 @@
             <ac:spMk id="5" creationId="{6939809F-DB7E-5BE9-1EA6-75425BDA083E}"/>
           </ac:spMkLst>
         </pc:spChg>
-        <pc:spChg chg="add del">
-          <ac:chgData name="Luis Fernando Rodriguez Gutierrez" userId="47d13518-703e-4604-b449-ba54b8feb907" providerId="ADAL" clId="{56418ACE-61C6-4AD3-AD16-975169FAD560}" dt="2025-01-25T12:14:46.348" v="1234" actId="26606"/>
-          <ac:spMkLst>
-            <pc:docMk/>
-            <pc:sldMk cId="100226028" sldId="271"/>
-            <ac:spMk id="3079" creationId="{979E27D9-03C7-44E2-9FF8-15D0C8506AF7}"/>
-          </ac:spMkLst>
-        </pc:spChg>
-        <pc:spChg chg="add del">
-          <ac:chgData name="Luis Fernando Rodriguez Gutierrez" userId="47d13518-703e-4604-b449-ba54b8feb907" providerId="ADAL" clId="{56418ACE-61C6-4AD3-AD16-975169FAD560}" dt="2025-01-25T12:14:46.348" v="1234" actId="26606"/>
-          <ac:spMkLst>
-            <pc:docMk/>
-            <pc:sldMk cId="100226028" sldId="271"/>
-            <ac:spMk id="3081" creationId="{EEBF1590-3B36-48EE-A89D-3B6F3CB256AB}"/>
-          </ac:spMkLst>
-        </pc:spChg>
-        <pc:spChg chg="add del">
-          <ac:chgData name="Luis Fernando Rodriguez Gutierrez" userId="47d13518-703e-4604-b449-ba54b8feb907" providerId="ADAL" clId="{56418ACE-61C6-4AD3-AD16-975169FAD560}" dt="2025-01-25T12:14:46.348" v="1234" actId="26606"/>
-          <ac:spMkLst>
-            <pc:docMk/>
-            <pc:sldMk cId="100226028" sldId="271"/>
-            <ac:spMk id="3083" creationId="{AC8F6C8C-AB5A-4548-942D-E3FD40ACBC49}"/>
-          </ac:spMkLst>
-        </pc:spChg>
         <pc:spChg chg="add">
           <ac:chgData name="Luis Fernando Rodriguez Gutierrez" userId="47d13518-703e-4604-b449-ba54b8feb907" providerId="ADAL" clId="{56418ACE-61C6-4AD3-AD16-975169FAD560}" dt="2025-01-25T12:14:46.348" v="1234" actId="26606"/>
           <ac:spMkLst>
@@ -1529,14 +873,6 @@
             <ac:spMk id="3092" creationId="{AC8F6C8C-AB5A-4548-942D-E3FD40ACBC49}"/>
           </ac:spMkLst>
         </pc:spChg>
-        <pc:picChg chg="del">
-          <ac:chgData name="Luis Fernando Rodriguez Gutierrez" userId="47d13518-703e-4604-b449-ba54b8feb907" providerId="ADAL" clId="{56418ACE-61C6-4AD3-AD16-975169FAD560}" dt="2025-01-25T12:05:11.131" v="936" actId="478"/>
-          <ac:picMkLst>
-            <pc:docMk/>
-            <pc:sldMk cId="100226028" sldId="271"/>
-            <ac:picMk id="6" creationId="{FBCC5732-80F6-9953-A617-17FE154D1BB4}"/>
-          </ac:picMkLst>
-        </pc:picChg>
         <pc:picChg chg="add mod">
           <ac:chgData name="Luis Fernando Rodriguez Gutierrez" userId="47d13518-703e-4604-b449-ba54b8feb907" providerId="ADAL" clId="{56418ACE-61C6-4AD3-AD16-975169FAD560}" dt="2025-01-25T12:14:36.893" v="1231" actId="26606"/>
           <ac:picMkLst>
@@ -1600,30 +936,109 @@
             <ac:spMk id="3083" creationId="{AC8F6C8C-AB5A-4548-942D-E3FD40ACBC49}"/>
           </ac:spMkLst>
         </pc:spChg>
-        <pc:spChg chg="del">
-          <ac:chgData name="Luis Fernando Rodriguez Gutierrez" userId="47d13518-703e-4604-b449-ba54b8feb907" providerId="ADAL" clId="{56418ACE-61C6-4AD3-AD16-975169FAD560}" dt="2025-01-25T12:14:59.895" v="1236"/>
+      </pc:sldChg>
+      <pc:sldChg chg="addSp delSp modSp mod">
+        <pc:chgData name="Luis Fernando Rodriguez Gutierrez" userId="47d13518-703e-4604-b449-ba54b8feb907" providerId="ADAL" clId="{56418ACE-61C6-4AD3-AD16-975169FAD560}" dt="2025-02-02T19:18:27.197" v="1898" actId="1076"/>
+        <pc:sldMkLst>
+          <pc:docMk/>
+          <pc:sldMk cId="4015210397" sldId="276"/>
+        </pc:sldMkLst>
+        <pc:spChg chg="mod">
+          <ac:chgData name="Luis Fernando Rodriguez Gutierrez" userId="47d13518-703e-4604-b449-ba54b8feb907" providerId="ADAL" clId="{56418ACE-61C6-4AD3-AD16-975169FAD560}" dt="2025-02-02T19:18:03.071" v="1891" actId="26606"/>
           <ac:spMkLst>
             <pc:docMk/>
-            <pc:sldMk cId="3504012682" sldId="272"/>
-            <ac:spMk id="3088" creationId="{8BEF5D70-8B7D-FCBE-A7B0-043F0D0BF322}"/>
+            <pc:sldMk cId="4015210397" sldId="276"/>
+            <ac:spMk id="2" creationId="{94B328AE-E53D-89D4-CE8C-E82025EE8E1F}"/>
           </ac:spMkLst>
         </pc:spChg>
-        <pc:spChg chg="del">
-          <ac:chgData name="Luis Fernando Rodriguez Gutierrez" userId="47d13518-703e-4604-b449-ba54b8feb907" providerId="ADAL" clId="{56418ACE-61C6-4AD3-AD16-975169FAD560}" dt="2025-01-25T12:14:59.895" v="1236"/>
+        <pc:spChg chg="add del mod">
+          <ac:chgData name="Luis Fernando Rodriguez Gutierrez" userId="47d13518-703e-4604-b449-ba54b8feb907" providerId="ADAL" clId="{56418ACE-61C6-4AD3-AD16-975169FAD560}" dt="2025-02-02T19:18:06.746" v="1893" actId="478"/>
           <ac:spMkLst>
             <pc:docMk/>
-            <pc:sldMk cId="3504012682" sldId="272"/>
-            <ac:spMk id="3090" creationId="{0574E166-482C-CC7A-D368-32804F847FEF}"/>
+            <pc:sldMk cId="4015210397" sldId="276"/>
+            <ac:spMk id="4" creationId="{00C8D31D-094B-1938-EFBC-3D867A1DD55A}"/>
           </ac:spMkLst>
         </pc:spChg>
-        <pc:spChg chg="del">
-          <ac:chgData name="Luis Fernando Rodriguez Gutierrez" userId="47d13518-703e-4604-b449-ba54b8feb907" providerId="ADAL" clId="{56418ACE-61C6-4AD3-AD16-975169FAD560}" dt="2025-01-25T12:14:59.895" v="1236"/>
+        <pc:spChg chg="add del">
+          <ac:chgData name="Luis Fernando Rodriguez Gutierrez" userId="47d13518-703e-4604-b449-ba54b8feb907" providerId="ADAL" clId="{56418ACE-61C6-4AD3-AD16-975169FAD560}" dt="2025-02-02T19:18:03.071" v="1891" actId="26606"/>
           <ac:spMkLst>
             <pc:docMk/>
-            <pc:sldMk cId="3504012682" sldId="272"/>
-            <ac:spMk id="3092" creationId="{1FF2E63D-BFAA-4BB9-7501-BDC3089F6A77}"/>
+            <pc:sldMk cId="4015210397" sldId="276"/>
+            <ac:spMk id="7" creationId="{64D80EC7-3EC5-C86D-E55F-3073D03EA18A}"/>
           </ac:spMkLst>
         </pc:spChg>
+        <pc:spChg chg="add del mod">
+          <ac:chgData name="Luis Fernando Rodriguez Gutierrez" userId="47d13518-703e-4604-b449-ba54b8feb907" providerId="ADAL" clId="{56418ACE-61C6-4AD3-AD16-975169FAD560}" dt="2025-02-02T19:18:10.430" v="1895" actId="22"/>
+          <ac:spMkLst>
+            <pc:docMk/>
+            <pc:sldMk cId="4015210397" sldId="276"/>
+            <ac:spMk id="10" creationId="{CBAAE50D-35B5-AB3D-624A-9C78C2F2680E}"/>
+          </ac:spMkLst>
+        </pc:spChg>
+        <pc:spChg chg="add del">
+          <ac:chgData name="Luis Fernando Rodriguez Gutierrez" userId="47d13518-703e-4604-b449-ba54b8feb907" providerId="ADAL" clId="{56418ACE-61C6-4AD3-AD16-975169FAD560}" dt="2025-02-02T19:18:03.071" v="1891" actId="26606"/>
+          <ac:spMkLst>
+            <pc:docMk/>
+            <pc:sldMk cId="4015210397" sldId="276"/>
+            <ac:spMk id="11" creationId="{A8384FB5-9ADC-4DDC-881B-597D56F5B15D}"/>
+          </ac:spMkLst>
+        </pc:spChg>
+        <pc:spChg chg="add del">
+          <ac:chgData name="Luis Fernando Rodriguez Gutierrez" userId="47d13518-703e-4604-b449-ba54b8feb907" providerId="ADAL" clId="{56418ACE-61C6-4AD3-AD16-975169FAD560}" dt="2025-02-02T19:18:03.071" v="1891" actId="26606"/>
+          <ac:spMkLst>
+            <pc:docMk/>
+            <pc:sldMk cId="4015210397" sldId="276"/>
+            <ac:spMk id="13" creationId="{1199E1B1-A8C0-4FE8-A5A8-1CB41D69F857}"/>
+          </ac:spMkLst>
+        </pc:spChg>
+        <pc:spChg chg="add del">
+          <ac:chgData name="Luis Fernando Rodriguez Gutierrez" userId="47d13518-703e-4604-b449-ba54b8feb907" providerId="ADAL" clId="{56418ACE-61C6-4AD3-AD16-975169FAD560}" dt="2025-02-02T19:18:03.071" v="1891" actId="26606"/>
+          <ac:spMkLst>
+            <pc:docMk/>
+            <pc:sldMk cId="4015210397" sldId="276"/>
+            <ac:spMk id="15" creationId="{84A8DE83-DE75-4B41-9DB4-A7EC0B0DEC0B}"/>
+          </ac:spMkLst>
+        </pc:spChg>
+        <pc:spChg chg="add del">
+          <ac:chgData name="Luis Fernando Rodriguez Gutierrez" userId="47d13518-703e-4604-b449-ba54b8feb907" providerId="ADAL" clId="{56418ACE-61C6-4AD3-AD16-975169FAD560}" dt="2025-02-02T19:18:03.071" v="1891" actId="26606"/>
+          <ac:spMkLst>
+            <pc:docMk/>
+            <pc:sldMk cId="4015210397" sldId="276"/>
+            <ac:spMk id="17" creationId="{A7009A0A-BEF5-4EAC-AF15-E4F9F002E239}"/>
+          </ac:spMkLst>
+        </pc:spChg>
+        <pc:grpChg chg="add del">
+          <ac:chgData name="Luis Fernando Rodriguez Gutierrez" userId="47d13518-703e-4604-b449-ba54b8feb907" providerId="ADAL" clId="{56418ACE-61C6-4AD3-AD16-975169FAD560}" dt="2025-02-02T19:18:03.071" v="1891" actId="26606"/>
+          <ac:grpSpMkLst>
+            <pc:docMk/>
+            <pc:sldMk cId="4015210397" sldId="276"/>
+            <ac:grpSpMk id="22" creationId="{6258F736-B256-8039-9DC6-F4E49A5C5AD5}"/>
+          </ac:grpSpMkLst>
+        </pc:grpChg>
+        <pc:picChg chg="add del">
+          <ac:chgData name="Luis Fernando Rodriguez Gutierrez" userId="47d13518-703e-4604-b449-ba54b8feb907" providerId="ADAL" clId="{56418ACE-61C6-4AD3-AD16-975169FAD560}" dt="2025-02-02T19:18:08.917" v="1894" actId="478"/>
+          <ac:picMkLst>
+            <pc:docMk/>
+            <pc:sldMk cId="4015210397" sldId="276"/>
+            <ac:picMk id="6" creationId="{972D9D15-B938-1168-CAFD-A871883B1EF9}"/>
+          </ac:picMkLst>
+        </pc:picChg>
+        <pc:picChg chg="add del mod">
+          <ac:chgData name="Luis Fernando Rodriguez Gutierrez" userId="47d13518-703e-4604-b449-ba54b8feb907" providerId="ADAL" clId="{56418ACE-61C6-4AD3-AD16-975169FAD560}" dt="2025-02-02T19:18:06.049" v="1892" actId="22"/>
+          <ac:picMkLst>
+            <pc:docMk/>
+            <pc:sldMk cId="4015210397" sldId="276"/>
+            <ac:picMk id="8" creationId="{641FA4CA-71C2-DA87-8CDD-532759DADD75}"/>
+          </ac:picMkLst>
+        </pc:picChg>
+        <pc:picChg chg="add mod ord">
+          <ac:chgData name="Luis Fernando Rodriguez Gutierrez" userId="47d13518-703e-4604-b449-ba54b8feb907" providerId="ADAL" clId="{56418ACE-61C6-4AD3-AD16-975169FAD560}" dt="2025-02-02T19:18:27.197" v="1898" actId="1076"/>
+          <ac:picMkLst>
+            <pc:docMk/>
+            <pc:sldMk cId="4015210397" sldId="276"/>
+            <ac:picMk id="14" creationId="{A9860273-CF92-338A-2A25-1D63B7228EA1}"/>
+          </ac:picMkLst>
+        </pc:picChg>
       </pc:sldChg>
     </pc:docChg>
   </pc:docChgLst>
@@ -9282,7 +8697,7 @@
           <a:lstStyle/>
           <a:p>
             <a:r>
-              <a:rPr lang="en-US" sz="4000" kern="1200" dirty="0">
+              <a:rPr lang="en-US" sz="4000" kern="1200">
                 <a:solidFill>
                   <a:srgbClr val="FFFFFF"/>
                 </a:solidFill>
@@ -9292,44 +8707,17 @@
               </a:rPr>
               <a:t>OBU - Software</a:t>
             </a:r>
-          </a:p>
-        </p:txBody>
-      </p:sp>
-      <p:pic>
-        <p:nvPicPr>
-          <p:cNvPr id="6" name="Content Placeholder 5" descr="A diagram of a software company&#10;&#10;Description automatically generated with medium confidence">
-            <a:extLst>
-              <a:ext uri="{FF2B5EF4-FFF2-40B4-BE49-F238E27FC236}">
-                <a16:creationId xmlns:a16="http://schemas.microsoft.com/office/drawing/2014/main" id="{972D9D15-B938-1168-CAFD-A871883B1EF9}"/>
-              </a:ext>
-            </a:extLst>
-          </p:cNvPr>
-          <p:cNvPicPr>
-            <a:picLocks noGrp="1" noChangeAspect="1"/>
-          </p:cNvPicPr>
-          <p:nvPr>
-            <p:ph idx="1"/>
-          </p:nvPr>
-        </p:nvPicPr>
-        <p:blipFill>
-          <a:blip r:embed="rId2">
-            <a:extLst>
-              <a:ext uri="{28A0092B-C50C-407E-A947-70E740481C1C}">
-                <a14:useLocalDpi xmlns:a14="http://schemas.microsoft.com/office/drawing/2010/main" val="0"/>
-              </a:ext>
-            </a:extLst>
-          </a:blip>
-          <a:stretch>
-            <a:fillRect/>
-          </a:stretch>
-        </p:blipFill>
-        <p:spPr>
-          <a:xfrm>
-            <a:off x="6328882" y="2039910"/>
-            <a:ext cx="5113527" cy="4351338"/>
-          </a:xfrm>
-        </p:spPr>
-      </p:pic>
+            <a:endParaRPr lang="en-US" sz="4000" kern="1200" dirty="0">
+              <a:solidFill>
+                <a:srgbClr val="FFFFFF"/>
+              </a:solidFill>
+              <a:latin typeface="+mj-lt"/>
+              <a:ea typeface="+mj-ea"/>
+              <a:cs typeface="+mj-cs"/>
+            </a:endParaRPr>
+          </a:p>
+        </p:txBody>
+      </p:sp>
       <p:sp>
         <p:nvSpPr>
           <p:cNvPr id="7" name="Content Placeholder 2">
@@ -9554,6 +8942,35 @@
           </a:p>
         </p:txBody>
       </p:sp>
+      <p:pic>
+        <p:nvPicPr>
+          <p:cNvPr id="14" name="Content Placeholder 13">
+            <a:extLst>
+              <a:ext uri="{FF2B5EF4-FFF2-40B4-BE49-F238E27FC236}">
+                <a16:creationId xmlns:a16="http://schemas.microsoft.com/office/drawing/2014/main" id="{A9860273-CF92-338A-2A25-1D63B7228EA1}"/>
+              </a:ext>
+            </a:extLst>
+          </p:cNvPr>
+          <p:cNvPicPr>
+            <a:picLocks noGrp="1" noChangeAspect="1"/>
+          </p:cNvPicPr>
+          <p:nvPr>
+            <p:ph idx="1"/>
+          </p:nvPr>
+        </p:nvPicPr>
+        <p:blipFill>
+          <a:blip r:embed="rId2"/>
+          <a:stretch>
+            <a:fillRect/>
+          </a:stretch>
+        </p:blipFill>
+        <p:spPr>
+          <a:xfrm>
+            <a:off x="6283661" y="1574310"/>
+            <a:ext cx="4894350" cy="4351338"/>
+          </a:xfrm>
+        </p:spPr>
+      </p:pic>
     </p:spTree>
     <p:extLst>
       <p:ext uri="{BB962C8B-B14F-4D97-AF65-F5344CB8AC3E}">

</xml_diff>

<commit_message>
Update presentation and readme
</commit_message>
<xml_diff>
--- a/Presentation/C-ITS.pptx
+++ b/Presentation/C-ITS.pptx
@@ -1270,7 +1270,7 @@
           <a:p>
             <a:fld id="{F8D372CF-70C8-4756-8EEA-216D48386233}" type="datetimeFigureOut">
               <a:rPr lang="en-US" smtClean="0"/>
-              <a:t>2/5/2025</a:t>
+              <a:t>2/6/2025</a:t>
             </a:fld>
             <a:endParaRPr lang="en-US"/>
           </a:p>
@@ -1768,7 +1768,7 @@
           <a:p>
             <a:fld id="{36EB16DF-0ACA-48CE-946C-1F1F648BD8AD}" type="datetime1">
               <a:rPr lang="en-US" smtClean="0"/>
-              <a:t>2/5/2025</a:t>
+              <a:t>2/6/2025</a:t>
             </a:fld>
             <a:endParaRPr lang="en-US"/>
           </a:p>
@@ -1969,7 +1969,7 @@
           <a:p>
             <a:fld id="{D49875A6-F379-4DD6-9B6B-A02AECDD8176}" type="datetime1">
               <a:rPr lang="en-US" smtClean="0"/>
-              <a:t>2/5/2025</a:t>
+              <a:t>2/6/2025</a:t>
             </a:fld>
             <a:endParaRPr lang="en-US"/>
           </a:p>
@@ -2180,7 +2180,7 @@
           <a:p>
             <a:fld id="{849C20AA-EF78-465A-93C3-B2902A2B03B4}" type="datetime1">
               <a:rPr lang="en-US" smtClean="0"/>
-              <a:t>2/5/2025</a:t>
+              <a:t>2/6/2025</a:t>
             </a:fld>
             <a:endParaRPr lang="en-US"/>
           </a:p>
@@ -2381,7 +2381,7 @@
           <a:p>
             <a:fld id="{D6D5B4D0-F6BF-42C9-B723-0E735610251C}" type="datetime1">
               <a:rPr lang="en-US" smtClean="0"/>
-              <a:t>2/5/2025</a:t>
+              <a:t>2/6/2025</a:t>
             </a:fld>
             <a:endParaRPr lang="en-US"/>
           </a:p>
@@ -2659,7 +2659,7 @@
           <a:p>
             <a:fld id="{58334CDB-F2DB-40CB-A30A-9A0B73F652BB}" type="datetime1">
               <a:rPr lang="en-US" smtClean="0"/>
-              <a:t>2/5/2025</a:t>
+              <a:t>2/6/2025</a:t>
             </a:fld>
             <a:endParaRPr lang="en-US"/>
           </a:p>
@@ -2927,7 +2927,7 @@
           <a:p>
             <a:fld id="{C53253D2-35D4-4E3E-A558-90DAA2A44133}" type="datetime1">
               <a:rPr lang="en-US" smtClean="0"/>
-              <a:t>2/5/2025</a:t>
+              <a:t>2/6/2025</a:t>
             </a:fld>
             <a:endParaRPr lang="en-US"/>
           </a:p>
@@ -3342,7 +3342,7 @@
           <a:p>
             <a:fld id="{0AF532BF-13CE-4C51-A9A5-85C2C70DFF03}" type="datetime1">
               <a:rPr lang="en-US" smtClean="0"/>
-              <a:t>2/5/2025</a:t>
+              <a:t>2/6/2025</a:t>
             </a:fld>
             <a:endParaRPr lang="en-US"/>
           </a:p>
@@ -3486,7 +3486,7 @@
           <a:p>
             <a:fld id="{3F814912-7FB5-4EEA-B750-65FDEA390F5A}" type="datetime1">
               <a:rPr lang="en-US" smtClean="0"/>
-              <a:t>2/5/2025</a:t>
+              <a:t>2/6/2025</a:t>
             </a:fld>
             <a:endParaRPr lang="en-US"/>
           </a:p>
@@ -3602,7 +3602,7 @@
           <a:p>
             <a:fld id="{CC35B2EB-08D1-4AE9-B787-E21D5A53243A}" type="datetime1">
               <a:rPr lang="en-US" smtClean="0"/>
-              <a:t>2/5/2025</a:t>
+              <a:t>2/6/2025</a:t>
             </a:fld>
             <a:endParaRPr lang="en-US"/>
           </a:p>
@@ -3916,7 +3916,7 @@
           <a:p>
             <a:fld id="{8ECC66DB-0115-4F51-9664-9587E3209E4F}" type="datetime1">
               <a:rPr lang="en-US" smtClean="0"/>
-              <a:t>2/5/2025</a:t>
+              <a:t>2/6/2025</a:t>
             </a:fld>
             <a:endParaRPr lang="en-US"/>
           </a:p>
@@ -4207,7 +4207,7 @@
           <a:p>
             <a:fld id="{3DD9D61E-1DED-4B2C-88D2-5FD19062878F}" type="datetime1">
               <a:rPr lang="en-US" smtClean="0"/>
-              <a:t>2/5/2025</a:t>
+              <a:t>2/6/2025</a:t>
             </a:fld>
             <a:endParaRPr lang="en-US"/>
           </a:p>
@@ -4451,7 +4451,7 @@
           <a:p>
             <a:fld id="{BC496AC7-115B-4C77-8EDF-D78EA21B7B89}" type="datetime1">
               <a:rPr lang="en-US" smtClean="0"/>
-              <a:t>2/5/2025</a:t>
+              <a:t>2/6/2025</a:t>
             </a:fld>
             <a:endParaRPr lang="en-US"/>
           </a:p>
@@ -8995,6 +8995,36 @@
           </a:p>
         </p:txBody>
       </p:sp>
+      <p:pic>
+        <p:nvPicPr>
+          <p:cNvPr id="4" name="Picture 3">
+            <a:extLst>
+              <a:ext uri="{FF2B5EF4-FFF2-40B4-BE49-F238E27FC236}">
+                <a16:creationId xmlns:a16="http://schemas.microsoft.com/office/drawing/2014/main" id="{76E2CEC8-B1F9-E10A-7BE1-60A95F577CD4}"/>
+              </a:ext>
+            </a:extLst>
+          </p:cNvPr>
+          <p:cNvPicPr>
+            <a:picLocks noChangeAspect="1"/>
+          </p:cNvPicPr>
+          <p:nvPr/>
+        </p:nvPicPr>
+        <p:blipFill>
+          <a:blip r:embed="rId5"/>
+          <a:stretch>
+            <a:fillRect/>
+          </a:stretch>
+        </p:blipFill>
+        <p:spPr>
+          <a:xfrm>
+            <a:off x="5763950" y="3463925"/>
+            <a:ext cx="780369" cy="335689"/>
+          </a:xfrm>
+          <a:prstGeom prst="rect">
+            <a:avLst/>
+          </a:prstGeom>
+        </p:spPr>
+      </p:pic>
     </p:spTree>
     <p:extLst>
       <p:ext uri="{BB962C8B-B14F-4D97-AF65-F5344CB8AC3E}">

</xml_diff>